<commit_message>
last update, finished documentation
</commit_message>
<xml_diff>
--- a/CrowdednessCampusGYM - Crisan Antonel Gabriel.pptx
+++ b/CrowdednessCampusGYM - Crisan Antonel Gabriel.pptx
@@ -5,17 +5,18 @@
     <p:sldMasterId id="2147483658" r:id="rId4"/>
   </p:sldMasterIdLst>
   <p:notesMasterIdLst>
-    <p:notesMasterId r:id="rId10"/>
+    <p:notesMasterId r:id="rId11"/>
   </p:notesMasterIdLst>
   <p:handoutMasterIdLst>
-    <p:handoutMasterId r:id="rId11"/>
+    <p:handoutMasterId r:id="rId12"/>
   </p:handoutMasterIdLst>
   <p:sldIdLst>
     <p:sldId id="383" r:id="rId5"/>
-    <p:sldId id="411" r:id="rId6"/>
-    <p:sldId id="412" r:id="rId7"/>
-    <p:sldId id="413" r:id="rId8"/>
-    <p:sldId id="391" r:id="rId9"/>
+    <p:sldId id="414" r:id="rId6"/>
+    <p:sldId id="411" r:id="rId7"/>
+    <p:sldId id="412" r:id="rId8"/>
+    <p:sldId id="413" r:id="rId9"/>
+    <p:sldId id="391" r:id="rId10"/>
   </p:sldIdLst>
   <p:sldSz cx="12192000" cy="6858000"/>
   <p:notesSz cx="6858000" cy="9144000"/>
@@ -141,23 +142,85 @@
 <pc:chgInfo xmlns:a="http://schemas.openxmlformats.org/drawingml/2006/main" xmlns:r="http://schemas.openxmlformats.org/officeDocument/2006/relationships" xmlns:ac="http://schemas.microsoft.com/office/drawing/2013/main/command" xmlns:pc="http://schemas.microsoft.com/office/powerpoint/2013/main/command">
   <pc:docChgLst>
     <pc:chgData name="Antonel Gabriel Crisan" userId="26cfa7d4-6b31-4a68-b91f-64ec4d1845ef" providerId="ADAL" clId="{D68DA9F3-24DF-4855-989B-ED8A481FD64E}"/>
-    <pc:docChg chg="modSld">
-      <pc:chgData name="Antonel Gabriel Crisan" userId="26cfa7d4-6b31-4a68-b91f-64ec4d1845ef" providerId="ADAL" clId="{D68DA9F3-24DF-4855-989B-ED8A481FD64E}" dt="2024-05-22T16:16:40.575" v="0" actId="207"/>
+    <pc:docChg chg="custSel addSld modSld">
+      <pc:chgData name="Antonel Gabriel Crisan" userId="26cfa7d4-6b31-4a68-b91f-64ec4d1845ef" providerId="ADAL" clId="{D68DA9F3-24DF-4855-989B-ED8A481FD64E}" dt="2024-05-29T15:48:12.538" v="75" actId="1076"/>
       <pc:docMkLst>
         <pc:docMk/>
       </pc:docMkLst>
+      <pc:sldChg chg="delSp modSp mod">
+        <pc:chgData name="Antonel Gabriel Crisan" userId="26cfa7d4-6b31-4a68-b91f-64ec4d1845ef" providerId="ADAL" clId="{D68DA9F3-24DF-4855-989B-ED8A481FD64E}" dt="2024-05-29T15:48:12.538" v="75" actId="1076"/>
+        <pc:sldMkLst>
+          <pc:docMk/>
+          <pc:sldMk cId="3346685798" sldId="383"/>
+        </pc:sldMkLst>
+        <pc:spChg chg="mod">
+          <ac:chgData name="Antonel Gabriel Crisan" userId="26cfa7d4-6b31-4a68-b91f-64ec4d1845ef" providerId="ADAL" clId="{D68DA9F3-24DF-4855-989B-ED8A481FD64E}" dt="2024-05-29T15:48:05.956" v="74" actId="1076"/>
+          <ac:spMkLst>
+            <pc:docMk/>
+            <pc:sldMk cId="3346685798" sldId="383"/>
+            <ac:spMk id="2" creationId="{B530BF65-C84B-45C3-72CA-AFDA68851174}"/>
+          </ac:spMkLst>
+        </pc:spChg>
+        <pc:spChg chg="del mod">
+          <ac:chgData name="Antonel Gabriel Crisan" userId="26cfa7d4-6b31-4a68-b91f-64ec4d1845ef" providerId="ADAL" clId="{D68DA9F3-24DF-4855-989B-ED8A481FD64E}" dt="2024-05-29T15:47:52.719" v="73" actId="21"/>
+          <ac:spMkLst>
+            <pc:docMk/>
+            <pc:sldMk cId="3346685798" sldId="383"/>
+            <ac:spMk id="3" creationId="{3B8EBC2C-6DD7-5003-38EB-40753046FE8C}"/>
+          </ac:spMkLst>
+        </pc:spChg>
+        <pc:spChg chg="mod">
+          <ac:chgData name="Antonel Gabriel Crisan" userId="26cfa7d4-6b31-4a68-b91f-64ec4d1845ef" providerId="ADAL" clId="{D68DA9F3-24DF-4855-989B-ED8A481FD64E}" dt="2024-05-29T15:48:12.538" v="75" actId="1076"/>
+          <ac:spMkLst>
+            <pc:docMk/>
+            <pc:sldMk cId="3346685798" sldId="383"/>
+            <ac:spMk id="5" creationId="{68C8393E-C0A1-BAB8-49CE-44ACF6CFBB9E}"/>
+          </ac:spMkLst>
+        </pc:spChg>
+      </pc:sldChg>
       <pc:sldChg chg="modSp mod">
-        <pc:chgData name="Antonel Gabriel Crisan" userId="26cfa7d4-6b31-4a68-b91f-64ec4d1845ef" providerId="ADAL" clId="{D68DA9F3-24DF-4855-989B-ED8A481FD64E}" dt="2024-05-22T16:16:40.575" v="0" actId="207"/>
+        <pc:chgData name="Antonel Gabriel Crisan" userId="26cfa7d4-6b31-4a68-b91f-64ec4d1845ef" providerId="ADAL" clId="{D68DA9F3-24DF-4855-989B-ED8A481FD64E}" dt="2024-05-29T15:44:22.309" v="47" actId="20577"/>
         <pc:sldMkLst>
           <pc:docMk/>
           <pc:sldMk cId="3200312026" sldId="391"/>
         </pc:sldMkLst>
         <pc:spChg chg="mod">
-          <ac:chgData name="Antonel Gabriel Crisan" userId="26cfa7d4-6b31-4a68-b91f-64ec4d1845ef" providerId="ADAL" clId="{D68DA9F3-24DF-4855-989B-ED8A481FD64E}" dt="2024-05-22T16:16:40.575" v="0" actId="207"/>
+          <ac:chgData name="Antonel Gabriel Crisan" userId="26cfa7d4-6b31-4a68-b91f-64ec4d1845ef" providerId="ADAL" clId="{D68DA9F3-24DF-4855-989B-ED8A481FD64E}" dt="2024-05-29T15:44:22.309" v="47" actId="20577"/>
           <ac:spMkLst>
             <pc:docMk/>
             <pc:sldMk cId="3200312026" sldId="391"/>
             <ac:spMk id="7" creationId="{F70BD87D-F7DA-961B-4024-A354DC87D168}"/>
+          </ac:spMkLst>
+        </pc:spChg>
+      </pc:sldChg>
+      <pc:sldChg chg="addSp delSp modSp add mod">
+        <pc:chgData name="Antonel Gabriel Crisan" userId="26cfa7d4-6b31-4a68-b91f-64ec4d1845ef" providerId="ADAL" clId="{D68DA9F3-24DF-4855-989B-ED8A481FD64E}" dt="2024-05-29T15:46:59.227" v="68" actId="20577"/>
+        <pc:sldMkLst>
+          <pc:docMk/>
+          <pc:sldMk cId="3652834633" sldId="414"/>
+        </pc:sldMkLst>
+        <pc:spChg chg="del">
+          <ac:chgData name="Antonel Gabriel Crisan" userId="26cfa7d4-6b31-4a68-b91f-64ec4d1845ef" providerId="ADAL" clId="{D68DA9F3-24DF-4855-989B-ED8A481FD64E}" dt="2024-05-29T15:46:11.370" v="56" actId="21"/>
+          <ac:spMkLst>
+            <pc:docMk/>
+            <pc:sldMk cId="3652834633" sldId="414"/>
+            <ac:spMk id="2" creationId="{B530BF65-C84B-45C3-72CA-AFDA68851174}"/>
+          </ac:spMkLst>
+        </pc:spChg>
+        <pc:spChg chg="del">
+          <ac:chgData name="Antonel Gabriel Crisan" userId="26cfa7d4-6b31-4a68-b91f-64ec4d1845ef" providerId="ADAL" clId="{D68DA9F3-24DF-4855-989B-ED8A481FD64E}" dt="2024-05-29T15:46:20.769" v="57" actId="21"/>
+          <ac:spMkLst>
+            <pc:docMk/>
+            <pc:sldMk cId="3652834633" sldId="414"/>
+            <ac:spMk id="5" creationId="{68C8393E-C0A1-BAB8-49CE-44ACF6CFBB9E}"/>
+          </ac:spMkLst>
+        </pc:spChg>
+        <pc:spChg chg="add mod">
+          <ac:chgData name="Antonel Gabriel Crisan" userId="26cfa7d4-6b31-4a68-b91f-64ec4d1845ef" providerId="ADAL" clId="{D68DA9F3-24DF-4855-989B-ED8A481FD64E}" dt="2024-05-29T15:46:59.227" v="68" actId="20577"/>
+          <ac:spMkLst>
+            <pc:docMk/>
+            <pc:sldMk cId="3652834633" sldId="414"/>
+            <ac:spMk id="6" creationId="{B4D64B90-8FE0-EE07-0103-E14003B25914}"/>
           </ac:spMkLst>
         </pc:spChg>
       </pc:sldChg>
@@ -223,7 +286,7 @@
           <a:p>
             <a:fld id="{1EBEDD12-BCD5-485B-BCBC-34BB01D7923C}" type="datetimeFigureOut">
               <a:rPr lang="en-US" smtClean="0"/>
-              <a:t>5/22/2024</a:t>
+              <a:t>5/29/2024</a:t>
             </a:fld>
             <a:endParaRPr lang="en-US" dirty="0"/>
           </a:p>
@@ -437,7 +500,7 @@
           <a:p>
             <a:fld id="{6EE7A52F-9D89-7442-A8E9-48D1527B5F6B}" type="datetimeFigureOut">
               <a:rPr lang="en-US" smtClean="0"/>
-              <a:t>5/22/2024</a:t>
+              <a:t>5/29/2024</a:t>
             </a:fld>
             <a:endParaRPr lang="en-US" dirty="0"/>
           </a:p>
@@ -862,7 +925,7 @@
     </p:spTree>
     <p:extLst>
       <p:ext uri="{BB962C8B-B14F-4D97-AF65-F5344CB8AC3E}">
-        <p14:creationId xmlns:p14="http://schemas.microsoft.com/office/powerpoint/2010/main" val="1356287986"/>
+        <p14:creationId xmlns:p14="http://schemas.microsoft.com/office/powerpoint/2010/main" val="3733253070"/>
       </p:ext>
     </p:extLst>
   </p:cSld>
@@ -946,7 +1009,7 @@
     </p:spTree>
     <p:extLst>
       <p:ext uri="{BB962C8B-B14F-4D97-AF65-F5344CB8AC3E}">
-        <p14:creationId xmlns:p14="http://schemas.microsoft.com/office/powerpoint/2010/main" val="1391583257"/>
+        <p14:creationId xmlns:p14="http://schemas.microsoft.com/office/powerpoint/2010/main" val="1356287986"/>
       </p:ext>
     </p:extLst>
   </p:cSld>
@@ -1030,7 +1093,7 @@
     </p:spTree>
     <p:extLst>
       <p:ext uri="{BB962C8B-B14F-4D97-AF65-F5344CB8AC3E}">
-        <p14:creationId xmlns:p14="http://schemas.microsoft.com/office/powerpoint/2010/main" val="3283728398"/>
+        <p14:creationId xmlns:p14="http://schemas.microsoft.com/office/powerpoint/2010/main" val="1391583257"/>
       </p:ext>
     </p:extLst>
   </p:cSld>
@@ -1106,6 +1169,90 @@
             <a:fld id="{A89C7E07-3C67-C64C-8DA0-0404F6303970}" type="slidenum">
               <a:rPr lang="en-US" smtClean="0"/>
               <a:t>5</a:t>
+            </a:fld>
+            <a:endParaRPr lang="en-US" dirty="0"/>
+          </a:p>
+        </p:txBody>
+      </p:sp>
+    </p:spTree>
+    <p:extLst>
+      <p:ext uri="{BB962C8B-B14F-4D97-AF65-F5344CB8AC3E}">
+        <p14:creationId xmlns:p14="http://schemas.microsoft.com/office/powerpoint/2010/main" val="3283728398"/>
+      </p:ext>
+    </p:extLst>
+  </p:cSld>
+  <p:clrMapOvr>
+    <a:masterClrMapping/>
+  </p:clrMapOvr>
+</p:notes>
+</file>
+
+<file path=ppt/notesSlides/notesSlide6.xml><?xml version="1.0" encoding="utf-8"?>
+<p:notes xmlns:a="http://schemas.openxmlformats.org/drawingml/2006/main" xmlns:r="http://schemas.openxmlformats.org/officeDocument/2006/relationships" xmlns:p="http://schemas.openxmlformats.org/presentationml/2006/main">
+  <p:cSld>
+    <p:spTree>
+      <p:nvGrpSpPr>
+        <p:cNvPr id="1" name=""/>
+        <p:cNvGrpSpPr/>
+        <p:nvPr/>
+      </p:nvGrpSpPr>
+      <p:grpSpPr>
+        <a:xfrm>
+          <a:off x="0" y="0"/>
+          <a:ext cx="0" cy="0"/>
+          <a:chOff x="0" y="0"/>
+          <a:chExt cx="0" cy="0"/>
+        </a:xfrm>
+      </p:grpSpPr>
+      <p:sp>
+        <p:nvSpPr>
+          <p:cNvPr id="2" name="Slide Image Placeholder 1"/>
+          <p:cNvSpPr>
+            <a:spLocks noGrp="1" noRot="1" noChangeAspect="1"/>
+          </p:cNvSpPr>
+          <p:nvPr>
+            <p:ph type="sldImg"/>
+          </p:nvPr>
+        </p:nvSpPr>
+        <p:spPr/>
+      </p:sp>
+      <p:sp>
+        <p:nvSpPr>
+          <p:cNvPr id="3" name="Notes Placeholder 2"/>
+          <p:cNvSpPr>
+            <a:spLocks noGrp="1"/>
+          </p:cNvSpPr>
+          <p:nvPr>
+            <p:ph type="body" idx="1"/>
+          </p:nvPr>
+        </p:nvSpPr>
+        <p:spPr/>
+        <p:txBody>
+          <a:bodyPr/>
+          <a:lstStyle/>
+          <a:p>
+            <a:endParaRPr lang="en-US" dirty="0"/>
+          </a:p>
+        </p:txBody>
+      </p:sp>
+      <p:sp>
+        <p:nvSpPr>
+          <p:cNvPr id="4" name="Slide Number Placeholder 3"/>
+          <p:cNvSpPr>
+            <a:spLocks noGrp="1"/>
+          </p:cNvSpPr>
+          <p:nvPr>
+            <p:ph type="sldNum" sz="quarter" idx="5"/>
+          </p:nvPr>
+        </p:nvSpPr>
+        <p:spPr/>
+        <p:txBody>
+          <a:bodyPr/>
+          <a:lstStyle/>
+          <a:p>
+            <a:fld id="{A89C7E07-3C67-C64C-8DA0-0404F6303970}" type="slidenum">
+              <a:rPr lang="en-US" smtClean="0"/>
+              <a:t>6</a:t>
             </a:fld>
             <a:endParaRPr lang="en-US" dirty="0"/>
           </a:p>
@@ -9460,7 +9607,7 @@
         </p:nvSpPr>
         <p:spPr>
           <a:xfrm>
-            <a:off x="594360" y="189572"/>
+            <a:off x="609749" y="2382266"/>
             <a:ext cx="6787747" cy="1593507"/>
           </a:xfrm>
         </p:spPr>
@@ -9486,52 +9633,6 @@
       </p:sp>
       <p:sp>
         <p:nvSpPr>
-          <p:cNvPr id="3" name="Text Placeholder 2">
-            <a:extLst>
-              <a:ext uri="{FF2B5EF4-FFF2-40B4-BE49-F238E27FC236}">
-                <a16:creationId xmlns:a16="http://schemas.microsoft.com/office/drawing/2014/main" id="{3B8EBC2C-6DD7-5003-38EB-40753046FE8C}"/>
-              </a:ext>
-            </a:extLst>
-          </p:cNvPr>
-          <p:cNvSpPr>
-            <a:spLocks noGrp="1"/>
-          </p:cNvSpPr>
-          <p:nvPr>
-            <p:ph sz="quarter" idx="13"/>
-          </p:nvPr>
-        </p:nvSpPr>
-        <p:spPr>
-          <a:xfrm>
-            <a:off x="593725" y="2281238"/>
-            <a:ext cx="6788150" cy="3709987"/>
-          </a:xfrm>
-        </p:spPr>
-        <p:txBody>
-          <a:bodyPr tIns="457200"/>
-          <a:lstStyle/>
-          <a:p>
-            <a:r>
-              <a:rPr lang="ro-RO" dirty="0"/>
-              <a:t>Optimizarea spațiilor în sălile de fitness</a:t>
-            </a:r>
-          </a:p>
-          <a:p>
-            <a:r>
-              <a:rPr lang="ro-RO" dirty="0"/>
-              <a:t>Îmbunătățirea experienței utilizatorilor prin predicții precise</a:t>
-            </a:r>
-          </a:p>
-          <a:p>
-            <a:r>
-              <a:rPr lang="ro-RO" dirty="0"/>
-              <a:t>Relevanța datelor</a:t>
-            </a:r>
-            <a:endParaRPr lang="en-US" dirty="0"/>
-          </a:p>
-        </p:txBody>
-      </p:sp>
-      <p:sp>
-        <p:nvSpPr>
           <p:cNvPr id="5" name="TextBox 4">
             <a:extLst>
               <a:ext uri="{FF2B5EF4-FFF2-40B4-BE49-F238E27FC236}">
@@ -9544,7 +9645,7 @@
         </p:nvSpPr>
         <p:spPr>
           <a:xfrm>
-            <a:off x="2735580" y="1965246"/>
+            <a:off x="4349496" y="3791107"/>
             <a:ext cx="6096000" cy="369332"/>
           </a:xfrm>
           <a:prstGeom prst="rect">
@@ -9606,40 +9707,6 @@
       </p:grpSpPr>
       <p:sp>
         <p:nvSpPr>
-          <p:cNvPr id="2" name="Title 1">
-            <a:extLst>
-              <a:ext uri="{FF2B5EF4-FFF2-40B4-BE49-F238E27FC236}">
-                <a16:creationId xmlns:a16="http://schemas.microsoft.com/office/drawing/2014/main" id="{B530BF65-C84B-45C3-72CA-AFDA68851174}"/>
-              </a:ext>
-            </a:extLst>
-          </p:cNvPr>
-          <p:cNvSpPr>
-            <a:spLocks noGrp="1"/>
-          </p:cNvSpPr>
-          <p:nvPr>
-            <p:ph type="title"/>
-          </p:nvPr>
-        </p:nvSpPr>
-        <p:spPr>
-          <a:xfrm>
-            <a:off x="594360" y="189572"/>
-            <a:ext cx="6787747" cy="1593507"/>
-          </a:xfrm>
-        </p:spPr>
-        <p:txBody>
-          <a:bodyPr/>
-          <a:lstStyle/>
-          <a:p>
-            <a:r>
-              <a:rPr lang="ro-RO" dirty="0"/>
-              <a:t>Baza de date</a:t>
-            </a:r>
-            <a:endParaRPr lang="en-US" dirty="0"/>
-          </a:p>
-        </p:txBody>
-      </p:sp>
-      <p:sp>
-        <p:nvSpPr>
           <p:cNvPr id="3" name="Text Placeholder 2">
             <a:extLst>
               <a:ext uri="{FF2B5EF4-FFF2-40B4-BE49-F238E27FC236}">
@@ -9656,158 +9723,67 @@
         </p:nvSpPr>
         <p:spPr>
           <a:xfrm>
-            <a:off x="593725" y="1907858"/>
-            <a:ext cx="6788150" cy="4287202"/>
+            <a:off x="593725" y="2281238"/>
+            <a:ext cx="6788150" cy="3709987"/>
           </a:xfrm>
         </p:spPr>
         <p:txBody>
-          <a:bodyPr tIns="457200">
-            <a:normAutofit lnSpcReduction="10000"/>
-          </a:bodyPr>
+          <a:bodyPr tIns="457200"/>
           <a:lstStyle/>
           <a:p>
             <a:r>
               <a:rPr lang="ro-RO" dirty="0"/>
-              <a:t>Număr de înregistrări </a:t>
-            </a:r>
-            <a:r>
-              <a:rPr lang="en-US" dirty="0"/>
-              <a:t>~</a:t>
-            </a:r>
+              <a:t>Optimizarea spațiilor în sălile de fitness</a:t>
+            </a:r>
+          </a:p>
+          <a:p>
             <a:r>
               <a:rPr lang="ro-RO" dirty="0"/>
-              <a:t>62.000</a:t>
+              <a:t>Îmbunătățirea experienței utilizatorilor prin predicții precise</a:t>
             </a:r>
           </a:p>
           <a:p>
             <a:r>
               <a:rPr lang="ro-RO" dirty="0"/>
-              <a:t>Câmpuri</a:t>
-            </a:r>
-          </a:p>
-          <a:p>
-            <a:pPr lvl="1"/>
-            <a:r>
-              <a:rPr lang="ro-RO" dirty="0">
-                <a:solidFill>
-                  <a:schemeClr val="tx2">
-                    <a:lumMod val="75000"/>
-                  </a:schemeClr>
-                </a:solidFill>
-              </a:rPr>
-              <a:t>1. Numărul de persoane în sala(variabila de răspuns)</a:t>
-            </a:r>
-          </a:p>
-          <a:p>
-            <a:pPr lvl="1"/>
-            <a:r>
-              <a:rPr lang="ro-RO" dirty="0">
-                <a:solidFill>
-                  <a:schemeClr val="tx2">
-                    <a:lumMod val="75000"/>
-                  </a:schemeClr>
-                </a:solidFill>
-              </a:rPr>
-              <a:t>2. Ziua săptămânii</a:t>
-            </a:r>
-          </a:p>
-          <a:p>
-            <a:pPr lvl="1"/>
-            <a:r>
-              <a:rPr lang="ro-RO" dirty="0">
-                <a:solidFill>
-                  <a:schemeClr val="tx2">
-                    <a:lumMod val="75000"/>
-                  </a:schemeClr>
-                </a:solidFill>
-              </a:rPr>
-              <a:t>3. Este weekend</a:t>
-            </a:r>
-          </a:p>
-          <a:p>
-            <a:pPr lvl="1"/>
-            <a:r>
-              <a:rPr lang="ro-RO" dirty="0">
-                <a:solidFill>
-                  <a:schemeClr val="tx2">
-                    <a:lumMod val="75000"/>
-                  </a:schemeClr>
-                </a:solidFill>
-              </a:rPr>
-              <a:t>4. Este vacantă</a:t>
-            </a:r>
-          </a:p>
-          <a:p>
-            <a:pPr lvl="1"/>
-            <a:r>
-              <a:rPr lang="ro-RO" dirty="0">
-                <a:solidFill>
-                  <a:schemeClr val="tx2">
-                    <a:lumMod val="75000"/>
-                  </a:schemeClr>
-                </a:solidFill>
-              </a:rPr>
-              <a:t>5. Temperatura</a:t>
-            </a:r>
-          </a:p>
-          <a:p>
-            <a:pPr lvl="1"/>
-            <a:r>
-              <a:rPr lang="ro-RO" dirty="0">
-                <a:solidFill>
-                  <a:schemeClr val="tx2">
-                    <a:lumMod val="75000"/>
-                  </a:schemeClr>
-                </a:solidFill>
-              </a:rPr>
-              <a:t>6. Este început de semestru</a:t>
-            </a:r>
-          </a:p>
-          <a:p>
-            <a:pPr lvl="1"/>
-            <a:r>
-              <a:rPr lang="ro-RO" dirty="0">
-                <a:solidFill>
-                  <a:schemeClr val="tx2">
-                    <a:lumMod val="75000"/>
-                  </a:schemeClr>
-                </a:solidFill>
-              </a:rPr>
-              <a:t>7. Este în timpul semestrului</a:t>
-            </a:r>
-          </a:p>
-          <a:p>
-            <a:pPr lvl="1"/>
-            <a:r>
-              <a:rPr lang="ro-RO" dirty="0">
-                <a:solidFill>
-                  <a:schemeClr val="tx2">
-                    <a:lumMod val="75000"/>
-                  </a:schemeClr>
-                </a:solidFill>
-              </a:rPr>
-              <a:t>8. Luna</a:t>
-            </a:r>
-          </a:p>
-          <a:p>
-            <a:pPr lvl="1"/>
-            <a:r>
-              <a:rPr lang="ro-RO" dirty="0">
-                <a:solidFill>
-                  <a:schemeClr val="tx2">
-                    <a:lumMod val="75000"/>
-                  </a:schemeClr>
-                </a:solidFill>
-              </a:rPr>
-              <a:t>9. Ora</a:t>
-            </a:r>
+              <a:t>Relevanța datelor</a:t>
+            </a:r>
+            <a:endParaRPr lang="en-US" dirty="0"/>
+          </a:p>
+        </p:txBody>
+      </p:sp>
+      <p:sp>
+        <p:nvSpPr>
+          <p:cNvPr id="6" name="Title 5">
+            <a:extLst>
+              <a:ext uri="{FF2B5EF4-FFF2-40B4-BE49-F238E27FC236}">
+                <a16:creationId xmlns:a16="http://schemas.microsoft.com/office/drawing/2014/main" id="{B4D64B90-8FE0-EE07-0103-E14003B25914}"/>
+              </a:ext>
+            </a:extLst>
+          </p:cNvPr>
+          <p:cNvSpPr>
+            <a:spLocks noGrp="1"/>
+          </p:cNvSpPr>
+          <p:nvPr>
+            <p:ph type="title"/>
+          </p:nvPr>
+        </p:nvSpPr>
+        <p:spPr/>
+        <p:txBody>
+          <a:bodyPr/>
+          <a:lstStyle/>
+          <a:p>
+            <a:r>
+              <a:rPr lang="ro-RO" dirty="0"/>
+              <a:t>Introducere</a:t>
+            </a:r>
+            <a:endParaRPr lang="en-US" dirty="0"/>
           </a:p>
         </p:txBody>
       </p:sp>
     </p:spTree>
     <p:extLst>
       <p:ext uri="{BB962C8B-B14F-4D97-AF65-F5344CB8AC3E}">
-        <p14:creationId xmlns:p14="http://schemas.microsoft.com/office/powerpoint/2010/main" val="1120192464"/>
+        <p14:creationId xmlns:p14="http://schemas.microsoft.com/office/powerpoint/2010/main" val="3652834633"/>
       </p:ext>
     </p:extLst>
   </p:cSld>
@@ -9862,7 +9838,7 @@
           <a:p>
             <a:r>
               <a:rPr lang="ro-RO" dirty="0"/>
-              <a:t>Prelucrarea datelor</a:t>
+              <a:t>Baza de date</a:t>
             </a:r>
             <a:endParaRPr lang="en-US" dirty="0"/>
           </a:p>
@@ -9892,10 +9868,31 @@
         </p:spPr>
         <p:txBody>
           <a:bodyPr tIns="457200">
-            <a:normAutofit/>
+            <a:normAutofit lnSpcReduction="10000"/>
           </a:bodyPr>
           <a:lstStyle/>
           <a:p>
+            <a:r>
+              <a:rPr lang="ro-RO" dirty="0"/>
+              <a:t>Număr de înregistrări </a:t>
+            </a:r>
+            <a:r>
+              <a:rPr lang="en-US" dirty="0"/>
+              <a:t>~</a:t>
+            </a:r>
+            <a:r>
+              <a:rPr lang="ro-RO" dirty="0"/>
+              <a:t>62.000</a:t>
+            </a:r>
+          </a:p>
+          <a:p>
+            <a:r>
+              <a:rPr lang="ro-RO" dirty="0"/>
+              <a:t>Câmpuri</a:t>
+            </a:r>
+          </a:p>
+          <a:p>
+            <a:pPr lvl="1"/>
             <a:r>
               <a:rPr lang="ro-RO" dirty="0">
                 <a:solidFill>
@@ -9904,71 +9901,119 @@
                   </a:schemeClr>
                 </a:solidFill>
               </a:rPr>
-              <a:t>Eliminarea datelor lipsă</a:t>
-            </a:r>
-          </a:p>
-          <a:p>
-            <a:r>
-              <a:rPr lang="ro-RO" dirty="0"/>
-              <a:t>Eliminarea coloanei de </a:t>
-            </a:r>
-            <a:r>
-              <a:rPr lang="ro-RO" dirty="0" err="1"/>
-              <a:t>timestamp</a:t>
-            </a:r>
-            <a:endParaRPr lang="ro-RO" dirty="0"/>
-          </a:p>
-          <a:p>
-            <a:r>
-              <a:rPr lang="ro-RO" dirty="0"/>
-              <a:t>Împărțirea datelor în seturi de antrenament și testare(80%-20%) folosind funcția </a:t>
-            </a:r>
-            <a:r>
-              <a:rPr lang="en-US" i="1" dirty="0"/>
-              <a:t>train</a:t>
-            </a:r>
-            <a:r>
-              <a:rPr lang="ro-RO" i="1" dirty="0"/>
-              <a:t>_</a:t>
-            </a:r>
-            <a:r>
-              <a:rPr lang="en-US" i="1" dirty="0"/>
-              <a:t>test </a:t>
-            </a:r>
-            <a:r>
-              <a:rPr lang="ro-RO" i="1" dirty="0"/>
-              <a:t>_</a:t>
-            </a:r>
-            <a:r>
-              <a:rPr lang="en-US" i="1" dirty="0"/>
-              <a:t>split </a:t>
-            </a:r>
-            <a:r>
-              <a:rPr lang="en-US" dirty="0"/>
-              <a:t>din </a:t>
-            </a:r>
-            <a:r>
-              <a:rPr lang="en-US" i="1" dirty="0"/>
-              <a:t>scikit-learn</a:t>
-            </a:r>
-            <a:r>
-              <a:rPr lang="ro-RO" dirty="0"/>
-              <a:t>	</a:t>
-            </a:r>
-            <a:endParaRPr lang="ro-RO" dirty="0">
-              <a:solidFill>
-                <a:schemeClr val="tx2">
-                  <a:lumMod val="75000"/>
-                </a:schemeClr>
-              </a:solidFill>
-            </a:endParaRPr>
+              <a:t>1. Numărul de persoane în sala(variabila de răspuns)</a:t>
+            </a:r>
+          </a:p>
+          <a:p>
+            <a:pPr lvl="1"/>
+            <a:r>
+              <a:rPr lang="ro-RO" dirty="0">
+                <a:solidFill>
+                  <a:schemeClr val="tx2">
+                    <a:lumMod val="75000"/>
+                  </a:schemeClr>
+                </a:solidFill>
+              </a:rPr>
+              <a:t>2. Ziua săptămânii</a:t>
+            </a:r>
+          </a:p>
+          <a:p>
+            <a:pPr lvl="1"/>
+            <a:r>
+              <a:rPr lang="ro-RO" dirty="0">
+                <a:solidFill>
+                  <a:schemeClr val="tx2">
+                    <a:lumMod val="75000"/>
+                  </a:schemeClr>
+                </a:solidFill>
+              </a:rPr>
+              <a:t>3. Este weekend</a:t>
+            </a:r>
+          </a:p>
+          <a:p>
+            <a:pPr lvl="1"/>
+            <a:r>
+              <a:rPr lang="ro-RO" dirty="0">
+                <a:solidFill>
+                  <a:schemeClr val="tx2">
+                    <a:lumMod val="75000"/>
+                  </a:schemeClr>
+                </a:solidFill>
+              </a:rPr>
+              <a:t>4. Este vacantă</a:t>
+            </a:r>
+          </a:p>
+          <a:p>
+            <a:pPr lvl="1"/>
+            <a:r>
+              <a:rPr lang="ro-RO" dirty="0">
+                <a:solidFill>
+                  <a:schemeClr val="tx2">
+                    <a:lumMod val="75000"/>
+                  </a:schemeClr>
+                </a:solidFill>
+              </a:rPr>
+              <a:t>5. Temperatura</a:t>
+            </a:r>
+          </a:p>
+          <a:p>
+            <a:pPr lvl="1"/>
+            <a:r>
+              <a:rPr lang="ro-RO" dirty="0">
+                <a:solidFill>
+                  <a:schemeClr val="tx2">
+                    <a:lumMod val="75000"/>
+                  </a:schemeClr>
+                </a:solidFill>
+              </a:rPr>
+              <a:t>6. Este început de semestru</a:t>
+            </a:r>
+          </a:p>
+          <a:p>
+            <a:pPr lvl="1"/>
+            <a:r>
+              <a:rPr lang="ro-RO" dirty="0">
+                <a:solidFill>
+                  <a:schemeClr val="tx2">
+                    <a:lumMod val="75000"/>
+                  </a:schemeClr>
+                </a:solidFill>
+              </a:rPr>
+              <a:t>7. Este în timpul semestrului</a:t>
+            </a:r>
+          </a:p>
+          <a:p>
+            <a:pPr lvl="1"/>
+            <a:r>
+              <a:rPr lang="ro-RO" dirty="0">
+                <a:solidFill>
+                  <a:schemeClr val="tx2">
+                    <a:lumMod val="75000"/>
+                  </a:schemeClr>
+                </a:solidFill>
+              </a:rPr>
+              <a:t>8. Luna</a:t>
+            </a:r>
+          </a:p>
+          <a:p>
+            <a:pPr lvl="1"/>
+            <a:r>
+              <a:rPr lang="ro-RO" dirty="0">
+                <a:solidFill>
+                  <a:schemeClr val="tx2">
+                    <a:lumMod val="75000"/>
+                  </a:schemeClr>
+                </a:solidFill>
+              </a:rPr>
+              <a:t>9. Ora</a:t>
+            </a:r>
           </a:p>
         </p:txBody>
       </p:sp>
     </p:spTree>
     <p:extLst>
       <p:ext uri="{BB962C8B-B14F-4D97-AF65-F5344CB8AC3E}">
-        <p14:creationId xmlns:p14="http://schemas.microsoft.com/office/powerpoint/2010/main" val="725577305"/>
+        <p14:creationId xmlns:p14="http://schemas.microsoft.com/office/powerpoint/2010/main" val="1120192464"/>
       </p:ext>
     </p:extLst>
   </p:cSld>
@@ -10023,7 +10068,7 @@
           <a:p>
             <a:r>
               <a:rPr lang="ro-RO" dirty="0"/>
-              <a:t>Algoritmi testați, modelul final</a:t>
+              <a:t>Prelucrarea datelor</a:t>
             </a:r>
             <a:endParaRPr lang="en-US" dirty="0"/>
           </a:p>
@@ -10065,73 +10110,71 @@
                   </a:schemeClr>
                 </a:solidFill>
               </a:rPr>
-              <a:t>Regresie liniară</a:t>
-            </a:r>
-          </a:p>
-          <a:p>
-            <a:r>
-              <a:rPr lang="ro-RO" dirty="0">
-                <a:solidFill>
-                  <a:schemeClr val="tx2">
-                    <a:lumMod val="75000"/>
-                  </a:schemeClr>
-                </a:solidFill>
-              </a:rPr>
-              <a:t>Rețele neurale artificiale</a:t>
+              <a:t>Eliminarea datelor lipsă</a:t>
+            </a:r>
+          </a:p>
+          <a:p>
+            <a:r>
+              <a:rPr lang="ro-RO" dirty="0"/>
+              <a:t>Eliminarea coloanei de </a:t>
+            </a:r>
+            <a:r>
+              <a:rPr lang="ro-RO" dirty="0" err="1"/>
+              <a:t>timestamp</a:t>
+            </a:r>
+            <a:endParaRPr lang="ro-RO" dirty="0"/>
+          </a:p>
+          <a:p>
+            <a:r>
+              <a:rPr lang="ro-RO" dirty="0"/>
+              <a:t>Împărțirea datelor în seturi de antrenament și testare(80%-20%) folosind funcția </a:t>
+            </a:r>
+            <a:r>
+              <a:rPr lang="en-US" i="1" dirty="0"/>
+              <a:t>train</a:t>
+            </a:r>
+            <a:r>
+              <a:rPr lang="ro-RO" i="1" dirty="0"/>
+              <a:t>_</a:t>
+            </a:r>
+            <a:r>
+              <a:rPr lang="en-US" i="1" dirty="0"/>
+              <a:t>test </a:t>
+            </a:r>
+            <a:r>
+              <a:rPr lang="ro-RO" i="1" dirty="0"/>
+              <a:t>_</a:t>
+            </a:r>
+            <a:r>
+              <a:rPr lang="en-US" i="1" dirty="0"/>
+              <a:t>split </a:t>
+            </a:r>
+            <a:r>
+              <a:rPr lang="en-US" dirty="0"/>
+              <a:t>din </a:t>
+            </a:r>
+            <a:r>
+              <a:rPr lang="en-US" i="1" dirty="0"/>
+              <a:t>scikit-learn</a:t>
             </a:r>
             <a:r>
               <a:rPr lang="ro-RO" dirty="0"/>
               <a:t>	</a:t>
             </a:r>
-          </a:p>
-          <a:p>
-            <a:r>
-              <a:rPr lang="ro-RO" dirty="0" err="1">
-                <a:solidFill>
-                  <a:schemeClr val="tx2">
-                    <a:lumMod val="75000"/>
-                  </a:schemeClr>
-                </a:solidFill>
-              </a:rPr>
-              <a:t>Random</a:t>
-            </a:r>
-            <a:r>
-              <a:rPr lang="ro-RO" dirty="0">
-                <a:solidFill>
-                  <a:schemeClr val="tx2">
-                    <a:lumMod val="75000"/>
-                  </a:schemeClr>
-                </a:solidFill>
-              </a:rPr>
-              <a:t> </a:t>
-            </a:r>
-            <a:r>
-              <a:rPr lang="ro-RO" dirty="0" err="1">
-                <a:solidFill>
-                  <a:schemeClr val="tx2">
-                    <a:lumMod val="75000"/>
-                  </a:schemeClr>
-                </a:solidFill>
-              </a:rPr>
-              <a:t>forest</a:t>
-            </a:r>
-            <a:r>
-              <a:rPr lang="ro-RO" dirty="0">
-                <a:solidFill>
-                  <a:schemeClr val="tx2">
-                    <a:lumMod val="75000"/>
-                  </a:schemeClr>
-                </a:solidFill>
-              </a:rPr>
-              <a:t> (modelul final)</a:t>
-            </a:r>
+            <a:endParaRPr lang="ro-RO" dirty="0">
+              <a:solidFill>
+                <a:schemeClr val="tx2">
+                  <a:lumMod val="75000"/>
+                </a:schemeClr>
+              </a:solidFill>
+            </a:endParaRPr>
           </a:p>
         </p:txBody>
       </p:sp>
     </p:spTree>
     <p:extLst>
       <p:ext uri="{BB962C8B-B14F-4D97-AF65-F5344CB8AC3E}">
-        <p14:creationId xmlns:p14="http://schemas.microsoft.com/office/powerpoint/2010/main" val="3570900279"/>
+        <p14:creationId xmlns:p14="http://schemas.microsoft.com/office/powerpoint/2010/main" val="725577305"/>
       </p:ext>
     </p:extLst>
   </p:cSld>
@@ -10160,6 +10203,169 @@
       </p:grpSpPr>
       <p:sp>
         <p:nvSpPr>
+          <p:cNvPr id="2" name="Title 1">
+            <a:extLst>
+              <a:ext uri="{FF2B5EF4-FFF2-40B4-BE49-F238E27FC236}">
+                <a16:creationId xmlns:a16="http://schemas.microsoft.com/office/drawing/2014/main" id="{B530BF65-C84B-45C3-72CA-AFDA68851174}"/>
+              </a:ext>
+            </a:extLst>
+          </p:cNvPr>
+          <p:cNvSpPr>
+            <a:spLocks noGrp="1"/>
+          </p:cNvSpPr>
+          <p:nvPr>
+            <p:ph type="title"/>
+          </p:nvPr>
+        </p:nvSpPr>
+        <p:spPr>
+          <a:xfrm>
+            <a:off x="594360" y="189572"/>
+            <a:ext cx="6787747" cy="1593507"/>
+          </a:xfrm>
+        </p:spPr>
+        <p:txBody>
+          <a:bodyPr/>
+          <a:lstStyle/>
+          <a:p>
+            <a:r>
+              <a:rPr lang="ro-RO" dirty="0"/>
+              <a:t>Algoritmi testați, modelul final</a:t>
+            </a:r>
+            <a:endParaRPr lang="en-US" dirty="0"/>
+          </a:p>
+        </p:txBody>
+      </p:sp>
+      <p:sp>
+        <p:nvSpPr>
+          <p:cNvPr id="3" name="Text Placeholder 2">
+            <a:extLst>
+              <a:ext uri="{FF2B5EF4-FFF2-40B4-BE49-F238E27FC236}">
+                <a16:creationId xmlns:a16="http://schemas.microsoft.com/office/drawing/2014/main" id="{3B8EBC2C-6DD7-5003-38EB-40753046FE8C}"/>
+              </a:ext>
+            </a:extLst>
+          </p:cNvPr>
+          <p:cNvSpPr>
+            <a:spLocks noGrp="1"/>
+          </p:cNvSpPr>
+          <p:nvPr>
+            <p:ph sz="quarter" idx="13"/>
+          </p:nvPr>
+        </p:nvSpPr>
+        <p:spPr>
+          <a:xfrm>
+            <a:off x="593725" y="1907858"/>
+            <a:ext cx="6788150" cy="4287202"/>
+          </a:xfrm>
+        </p:spPr>
+        <p:txBody>
+          <a:bodyPr tIns="457200">
+            <a:normAutofit/>
+          </a:bodyPr>
+          <a:lstStyle/>
+          <a:p>
+            <a:r>
+              <a:rPr lang="ro-RO" dirty="0">
+                <a:solidFill>
+                  <a:schemeClr val="tx2">
+                    <a:lumMod val="75000"/>
+                  </a:schemeClr>
+                </a:solidFill>
+              </a:rPr>
+              <a:t>Regresie liniară</a:t>
+            </a:r>
+          </a:p>
+          <a:p>
+            <a:r>
+              <a:rPr lang="ro-RO" dirty="0">
+                <a:solidFill>
+                  <a:schemeClr val="tx2">
+                    <a:lumMod val="75000"/>
+                  </a:schemeClr>
+                </a:solidFill>
+              </a:rPr>
+              <a:t>Rețele neurale artificiale</a:t>
+            </a:r>
+            <a:r>
+              <a:rPr lang="ro-RO" dirty="0"/>
+              <a:t>	</a:t>
+            </a:r>
+          </a:p>
+          <a:p>
+            <a:r>
+              <a:rPr lang="ro-RO" dirty="0" err="1">
+                <a:solidFill>
+                  <a:schemeClr val="tx2">
+                    <a:lumMod val="75000"/>
+                  </a:schemeClr>
+                </a:solidFill>
+              </a:rPr>
+              <a:t>Random</a:t>
+            </a:r>
+            <a:r>
+              <a:rPr lang="ro-RO" dirty="0">
+                <a:solidFill>
+                  <a:schemeClr val="tx2">
+                    <a:lumMod val="75000"/>
+                  </a:schemeClr>
+                </a:solidFill>
+              </a:rPr>
+              <a:t> </a:t>
+            </a:r>
+            <a:r>
+              <a:rPr lang="ro-RO" dirty="0" err="1">
+                <a:solidFill>
+                  <a:schemeClr val="tx2">
+                    <a:lumMod val="75000"/>
+                  </a:schemeClr>
+                </a:solidFill>
+              </a:rPr>
+              <a:t>forest</a:t>
+            </a:r>
+            <a:r>
+              <a:rPr lang="ro-RO" dirty="0">
+                <a:solidFill>
+                  <a:schemeClr val="tx2">
+                    <a:lumMod val="75000"/>
+                  </a:schemeClr>
+                </a:solidFill>
+              </a:rPr>
+              <a:t> (modelul final)</a:t>
+            </a:r>
+          </a:p>
+        </p:txBody>
+      </p:sp>
+    </p:spTree>
+    <p:extLst>
+      <p:ext uri="{BB962C8B-B14F-4D97-AF65-F5344CB8AC3E}">
+        <p14:creationId xmlns:p14="http://schemas.microsoft.com/office/powerpoint/2010/main" val="3570900279"/>
+      </p:ext>
+    </p:extLst>
+  </p:cSld>
+  <p:clrMapOvr>
+    <a:masterClrMapping/>
+  </p:clrMapOvr>
+</p:sld>
+</file>
+
+<file path=ppt/slides/slide6.xml><?xml version="1.0" encoding="utf-8"?>
+<p:sld xmlns:a="http://schemas.openxmlformats.org/drawingml/2006/main" xmlns:r="http://schemas.openxmlformats.org/officeDocument/2006/relationships" xmlns:p="http://schemas.openxmlformats.org/presentationml/2006/main">
+  <p:cSld>
+    <p:spTree>
+      <p:nvGrpSpPr>
+        <p:cNvPr id="1" name=""/>
+        <p:cNvGrpSpPr/>
+        <p:nvPr/>
+      </p:nvGrpSpPr>
+      <p:grpSpPr>
+        <a:xfrm>
+          <a:off x="0" y="0"/>
+          <a:ext cx="0" cy="0"/>
+          <a:chOff x="0" y="0"/>
+          <a:chExt cx="0" cy="0"/>
+        </a:xfrm>
+      </p:grpSpPr>
+      <p:sp>
+        <p:nvSpPr>
           <p:cNvPr id="3" name="Title 2">
             <a:extLst>
               <a:ext uri="{FF2B5EF4-FFF2-40B4-BE49-F238E27FC236}">
@@ -10487,6 +10693,43 @@
                 </a:solidFill>
               </a:rPr>
               <a:t>Impactul zilelor de weekend și a vacanțelor asupra fluxului de persoane</a:t>
+            </a:r>
+            <a:endParaRPr lang="en-US" dirty="0">
+              <a:solidFill>
+                <a:schemeClr val="tx2">
+                  <a:lumMod val="75000"/>
+                </a:schemeClr>
+              </a:solidFill>
+            </a:endParaRPr>
+          </a:p>
+          <a:p>
+            <a:pPr lvl="1" indent="-457200">
+              <a:lnSpc>
+                <a:spcPct val="100000"/>
+              </a:lnSpc>
+              <a:spcBef>
+                <a:spcPts val="0"/>
+              </a:spcBef>
+            </a:pPr>
+            <a:r>
+              <a:rPr lang="en-US" dirty="0">
+                <a:solidFill>
+                  <a:schemeClr val="tx2">
+                    <a:lumMod val="75000"/>
+                  </a:schemeClr>
+                </a:solidFill>
+              </a:rPr>
+              <a:t>Nu</a:t>
+            </a:r>
+            <a:r>
+              <a:rPr lang="ro-RO" dirty="0">
+                <a:solidFill>
+                  <a:schemeClr val="tx2">
+                    <a:lumMod val="75000"/>
+                  </a:schemeClr>
+                </a:solidFill>
+              </a:rPr>
+              <a:t>mărul de persoane prezente și ora din zi</a:t>
             </a:r>
           </a:p>
         </p:txBody>
@@ -11700,6 +11943,15 @@
 </file>
 
 <file path=customXml/item1.xml><?xml version="1.0" encoding="utf-8"?>
+<?mso-contentType ?>
+<FormTemplates xmlns="http://schemas.microsoft.com/sharepoint/v3/contenttype/forms">
+  <Display>DocumentLibraryForm</Display>
+  <Edit>DocumentLibraryForm</Edit>
+  <New>DocumentLibraryForm</New>
+</FormTemplates>
+</file>
+
+<file path=customXml/item2.xml><?xml version="1.0" encoding="utf-8"?>
 <ct:contentTypeSchema xmlns:ct="http://schemas.microsoft.com/office/2006/metadata/contentType" xmlns:ma="http://schemas.microsoft.com/office/2006/metadata/properties/metaAttributes" ct:_="" ma:_="" ma:contentTypeName="Document" ma:contentTypeID="0x01010079F111ED35F8CC479449609E8A0923A6" ma:contentTypeVersion="28" ma:contentTypeDescription="Create a new document." ma:contentTypeScope="" ma:versionID="60f5a4f2d2b0abadcf532d48ebf9cb71">
   <xsd:schema xmlns:xsd="http://www.w3.org/2001/XMLSchema" xmlns:xs="http://www.w3.org/2001/XMLSchema" xmlns:p="http://schemas.microsoft.com/office/2006/metadata/properties" xmlns:ns1="http://schemas.microsoft.com/sharepoint/v3" xmlns:ns2="71af3243-3dd4-4a8d-8c0d-dd76da1f02a5" xmlns:ns3="16c05727-aa75-4e4a-9b5f-8a80a1165891" xmlns:ns4="230e9df3-be65-4c73-a93b-d1236ebd677e" targetNamespace="http://schemas.microsoft.com/office/2006/metadata/properties" ma:root="true" ma:fieldsID="7dd78129e6a1811f84807ad11c651531" ns1:_="" ns2:_="" ns3:_="" ns4:_="">
     <xsd:import namespace="http://schemas.microsoft.com/sharepoint/v3"/>
@@ -12011,15 +12263,6 @@
 </ct:contentTypeSchema>
 </file>
 
-<file path=customXml/item2.xml><?xml version="1.0" encoding="utf-8"?>
-<?mso-contentType ?>
-<FormTemplates xmlns="http://schemas.microsoft.com/sharepoint/v3/contenttype/forms">
-  <Display>DocumentLibraryForm</Display>
-  <Edit>DocumentLibraryForm</Edit>
-  <New>DocumentLibraryForm</New>
-</FormTemplates>
-</file>
-
 <file path=customXml/item3.xml><?xml version="1.0" encoding="utf-8"?>
 <p:properties xmlns:p="http://schemas.microsoft.com/office/2006/metadata/properties" xmlns:xsi="http://www.w3.org/2001/XMLSchema-instance" xmlns:pc="http://schemas.microsoft.com/office/infopath/2007/PartnerControls">
   <documentManagement>
@@ -12041,6 +12284,14 @@
 </file>
 
 <file path=customXml/itemProps1.xml><?xml version="1.0" encoding="utf-8"?>
+<ds:datastoreItem xmlns:ds="http://schemas.openxmlformats.org/officeDocument/2006/customXml" ds:itemID="{C21FFAC0-05A2-416A-B06C-C248395482CF}">
+  <ds:schemaRefs>
+    <ds:schemaRef ds:uri="http://schemas.microsoft.com/sharepoint/v3/contenttype/forms"/>
+  </ds:schemaRefs>
+</ds:datastoreItem>
+</file>
+
+<file path=customXml/itemProps2.xml><?xml version="1.0" encoding="utf-8"?>
 <ds:datastoreItem xmlns:ds="http://schemas.openxmlformats.org/officeDocument/2006/customXml" ds:itemID="{92DB9E12-8AC3-4138-BF4D-720A5525AB10}">
   <ds:schemaRefs>
     <ds:schemaRef ds:uri="http://schemas.microsoft.com/office/2006/metadata/contentType"/>
@@ -12061,14 +12312,6 @@
 </ds:datastoreItem>
 </file>
 
-<file path=customXml/itemProps2.xml><?xml version="1.0" encoding="utf-8"?>
-<ds:datastoreItem xmlns:ds="http://schemas.openxmlformats.org/officeDocument/2006/customXml" ds:itemID="{C21FFAC0-05A2-416A-B06C-C248395482CF}">
-  <ds:schemaRefs>
-    <ds:schemaRef ds:uri="http://schemas.microsoft.com/sharepoint/v3/contenttype/forms"/>
-  </ds:schemaRefs>
-</ds:datastoreItem>
-</file>
-
 <file path=customXml/itemProps3.xml><?xml version="1.0" encoding="utf-8"?>
 <ds:datastoreItem xmlns:ds="http://schemas.openxmlformats.org/officeDocument/2006/customXml" ds:itemID="{4F4B194E-8B30-4377-8C59-ECFB902D2A26}">
   <ds:schemaRefs>

</xml_diff>